<commit_message>
Fixed crash Changed ui settings
</commit_message>
<xml_diff>
--- a/Documents/Презентация.pptx
+++ b/Documents/Презентация.pptx
@@ -1616,7 +1616,7 @@
 <dgm:dataModel xmlns:dgm="http://schemas.openxmlformats.org/drawingml/2006/diagram" xmlns:a="http://schemas.openxmlformats.org/drawingml/2006/main">
   <dgm:ptLst>
     <dgm:pt modelId="{7B0320A2-7FEA-4264-BE1D-DE1651F1E63C}" type="doc">
-      <dgm:prSet loTypeId="urn:microsoft.com/office/officeart/2005/8/layout/default" loCatId="list" qsTypeId="urn:microsoft.com/office/officeart/2005/8/quickstyle/simple1" qsCatId="simple" csTypeId="urn:microsoft.com/office/officeart/2005/8/colors/accent1_2" csCatId="accent1" phldr="1"/>
+      <dgm:prSet loTypeId="urn:microsoft.com/office/officeart/2005/8/layout/default#1" loCatId="list" qsTypeId="urn:microsoft.com/office/officeart/2005/8/quickstyle/simple1" qsCatId="simple" csTypeId="urn:microsoft.com/office/officeart/2005/8/colors/accent1_2" csCatId="accent1" phldr="1"/>
       <dgm:spPr/>
       <dgm:t>
         <a:bodyPr/>
@@ -1782,6 +1782,13 @@
         </dgm:presLayoutVars>
       </dgm:prSet>
       <dgm:spPr/>
+      <dgm:t>
+        <a:bodyPr/>
+        <a:lstStyle/>
+        <a:p>
+          <a:endParaRPr lang="ru-RU"/>
+        </a:p>
+      </dgm:t>
     </dgm:pt>
     <dgm:pt modelId="{6125DBD9-9EC7-4AC3-8734-025DAA5BAB09}" type="pres">
       <dgm:prSet presAssocID="{D22F9CFA-2BDA-4924-A2C3-96C3088EBFE1}" presName="node" presStyleLbl="node1" presStyleIdx="0" presStyleCnt="4" custLinFactNeighborY="-828">
@@ -1790,6 +1797,13 @@
         </dgm:presLayoutVars>
       </dgm:prSet>
       <dgm:spPr/>
+      <dgm:t>
+        <a:bodyPr/>
+        <a:lstStyle/>
+        <a:p>
+          <a:endParaRPr lang="ru-RU"/>
+        </a:p>
+      </dgm:t>
     </dgm:pt>
     <dgm:pt modelId="{3E40D1CF-79DF-4C39-85AB-03CF72679298}" type="pres">
       <dgm:prSet presAssocID="{747621A6-AF33-4A12-8989-F566CF283835}" presName="sibTrans" presStyleCnt="0"/>
@@ -1821,6 +1835,13 @@
         </dgm:presLayoutVars>
       </dgm:prSet>
       <dgm:spPr/>
+      <dgm:t>
+        <a:bodyPr/>
+        <a:lstStyle/>
+        <a:p>
+          <a:endParaRPr lang="ru-RU"/>
+        </a:p>
+      </dgm:t>
     </dgm:pt>
     <dgm:pt modelId="{D7D3C4A5-E828-4277-B02F-D7AFCD318E4A}" type="pres">
       <dgm:prSet presAssocID="{17A88EEE-B45A-455B-9150-3121669EA2EA}" presName="sibTrans" presStyleCnt="0"/>
@@ -1833,31 +1854,38 @@
         </dgm:presLayoutVars>
       </dgm:prSet>
       <dgm:spPr/>
+      <dgm:t>
+        <a:bodyPr/>
+        <a:lstStyle/>
+        <a:p>
+          <a:endParaRPr lang="ru-RU"/>
+        </a:p>
+      </dgm:t>
     </dgm:pt>
   </dgm:ptLst>
   <dgm:cxnLst>
     <dgm:cxn modelId="{585A2B5B-404E-4DF3-83AE-09FCADE21384}" srcId="{7B0320A2-7FEA-4264-BE1D-DE1651F1E63C}" destId="{262940EC-393B-4F90-BCA1-922335DCFFD2}" srcOrd="1" destOrd="0" parTransId="{CF1475CC-E130-44A6-9432-1010430FBD95}" sibTransId="{912FB4A6-1C9C-4A33-B3E2-0FE15325131A}"/>
-    <dgm:cxn modelId="{6CEE5ADB-FA2C-43B2-B92F-BCF227B8BFCC}" type="presOf" srcId="{BC3A489D-9A28-45EC-A38F-D5AA20F2FAB9}" destId="{D76A0D31-F925-4004-800C-B6247BFAAA61}" srcOrd="0" destOrd="0" presId="urn:microsoft.com/office/officeart/2005/8/layout/default"/>
-    <dgm:cxn modelId="{CA7C9741-A0E6-4BAA-8A3A-41325B07CD34}" type="presOf" srcId="{7B0320A2-7FEA-4264-BE1D-DE1651F1E63C}" destId="{691C47FB-13A3-472B-BB44-EF786934BD4E}" srcOrd="0" destOrd="0" presId="urn:microsoft.com/office/officeart/2005/8/layout/default"/>
-    <dgm:cxn modelId="{A9002323-1AA9-4FE2-A80F-BD4B55365EF6}" type="presOf" srcId="{262940EC-393B-4F90-BCA1-922335DCFFD2}" destId="{AEAEB115-779F-487F-810D-60C7F890E03C}" srcOrd="0" destOrd="0" presId="urn:microsoft.com/office/officeart/2005/8/layout/default"/>
-    <dgm:cxn modelId="{25D5109B-BFA9-49D0-B4BF-1134342CC2F4}" type="presOf" srcId="{24D7BA08-A1F9-4F7B-9745-E2A5F82A5105}" destId="{D831E01B-93CF-4055-B393-B1C870C45908}" srcOrd="0" destOrd="0" presId="urn:microsoft.com/office/officeart/2005/8/layout/default"/>
-    <dgm:cxn modelId="{F2EBD42D-D5E6-4B8B-82F6-6DE5C62AEC53}" type="presOf" srcId="{D22F9CFA-2BDA-4924-A2C3-96C3088EBFE1}" destId="{6125DBD9-9EC7-4AC3-8734-025DAA5BAB09}" srcOrd="0" destOrd="0" presId="urn:microsoft.com/office/officeart/2005/8/layout/default"/>
+    <dgm:cxn modelId="{6CEE5ADB-FA2C-43B2-B92F-BCF227B8BFCC}" type="presOf" srcId="{BC3A489D-9A28-45EC-A38F-D5AA20F2FAB9}" destId="{D76A0D31-F925-4004-800C-B6247BFAAA61}" srcOrd="0" destOrd="0" presId="urn:microsoft.com/office/officeart/2005/8/layout/default#1"/>
+    <dgm:cxn modelId="{CA7C9741-A0E6-4BAA-8A3A-41325B07CD34}" type="presOf" srcId="{7B0320A2-7FEA-4264-BE1D-DE1651F1E63C}" destId="{691C47FB-13A3-472B-BB44-EF786934BD4E}" srcOrd="0" destOrd="0" presId="urn:microsoft.com/office/officeart/2005/8/layout/default#1"/>
+    <dgm:cxn modelId="{A9002323-1AA9-4FE2-A80F-BD4B55365EF6}" type="presOf" srcId="{262940EC-393B-4F90-BCA1-922335DCFFD2}" destId="{AEAEB115-779F-487F-810D-60C7F890E03C}" srcOrd="0" destOrd="0" presId="urn:microsoft.com/office/officeart/2005/8/layout/default#1"/>
+    <dgm:cxn modelId="{25D5109B-BFA9-49D0-B4BF-1134342CC2F4}" type="presOf" srcId="{24D7BA08-A1F9-4F7B-9745-E2A5F82A5105}" destId="{D831E01B-93CF-4055-B393-B1C870C45908}" srcOrd="0" destOrd="0" presId="urn:microsoft.com/office/officeart/2005/8/layout/default#1"/>
+    <dgm:cxn modelId="{F2EBD42D-D5E6-4B8B-82F6-6DE5C62AEC53}" type="presOf" srcId="{D22F9CFA-2BDA-4924-A2C3-96C3088EBFE1}" destId="{6125DBD9-9EC7-4AC3-8734-025DAA5BAB09}" srcOrd="0" destOrd="0" presId="urn:microsoft.com/office/officeart/2005/8/layout/default#1"/>
     <dgm:cxn modelId="{B147B5DB-EDAE-4867-B9B4-428D4166A8F8}" srcId="{7B0320A2-7FEA-4264-BE1D-DE1651F1E63C}" destId="{24D7BA08-A1F9-4F7B-9745-E2A5F82A5105}" srcOrd="2" destOrd="0" parTransId="{F770CA14-4F94-478A-AA77-5BE5D66D5792}" sibTransId="{17A88EEE-B45A-455B-9150-3121669EA2EA}"/>
     <dgm:cxn modelId="{46ACCB3F-3561-47FE-AD15-A469984B25A4}" srcId="{7B0320A2-7FEA-4264-BE1D-DE1651F1E63C}" destId="{D22F9CFA-2BDA-4924-A2C3-96C3088EBFE1}" srcOrd="0" destOrd="0" parTransId="{F06FFE8A-DA3E-4880-9450-E1E9564C6914}" sibTransId="{747621A6-AF33-4A12-8989-F566CF283835}"/>
     <dgm:cxn modelId="{C35F06E8-4462-4A06-8DCD-637056A08C8F}" srcId="{7B0320A2-7FEA-4264-BE1D-DE1651F1E63C}" destId="{BC3A489D-9A28-45EC-A38F-D5AA20F2FAB9}" srcOrd="3" destOrd="0" parTransId="{5D428E16-6B2E-4D74-B87C-A3311B016B8E}" sibTransId="{FD4C913B-1065-445F-BAB9-00A5A4AB7827}"/>
-    <dgm:cxn modelId="{AEFCBD31-7672-44DF-AA7E-70CB1D1F05CF}" type="presParOf" srcId="{691C47FB-13A3-472B-BB44-EF786934BD4E}" destId="{6125DBD9-9EC7-4AC3-8734-025DAA5BAB09}" srcOrd="0" destOrd="0" presId="urn:microsoft.com/office/officeart/2005/8/layout/default"/>
-    <dgm:cxn modelId="{8AF96208-02DD-42A8-80BC-EF4A2C380375}" type="presParOf" srcId="{691C47FB-13A3-472B-BB44-EF786934BD4E}" destId="{3E40D1CF-79DF-4C39-85AB-03CF72679298}" srcOrd="1" destOrd="0" presId="urn:microsoft.com/office/officeart/2005/8/layout/default"/>
-    <dgm:cxn modelId="{52E06E64-8C2A-4754-9A6E-4CB9EEC9EBCA}" type="presParOf" srcId="{691C47FB-13A3-472B-BB44-EF786934BD4E}" destId="{AEAEB115-779F-487F-810D-60C7F890E03C}" srcOrd="2" destOrd="0" presId="urn:microsoft.com/office/officeart/2005/8/layout/default"/>
-    <dgm:cxn modelId="{B6CDC740-A68A-4D8A-A871-24691072D5DB}" type="presParOf" srcId="{691C47FB-13A3-472B-BB44-EF786934BD4E}" destId="{C279321C-6A40-4987-9592-BB6E77BB6B17}" srcOrd="3" destOrd="0" presId="urn:microsoft.com/office/officeart/2005/8/layout/default"/>
-    <dgm:cxn modelId="{CE6EC87D-9E32-4425-BEA8-298C69AFFFB1}" type="presParOf" srcId="{691C47FB-13A3-472B-BB44-EF786934BD4E}" destId="{D831E01B-93CF-4055-B393-B1C870C45908}" srcOrd="4" destOrd="0" presId="urn:microsoft.com/office/officeart/2005/8/layout/default"/>
-    <dgm:cxn modelId="{0CF7494B-70CB-40BA-A330-0F487F97D391}" type="presParOf" srcId="{691C47FB-13A3-472B-BB44-EF786934BD4E}" destId="{D7D3C4A5-E828-4277-B02F-D7AFCD318E4A}" srcOrd="5" destOrd="0" presId="urn:microsoft.com/office/officeart/2005/8/layout/default"/>
-    <dgm:cxn modelId="{F45B4201-702C-4461-BFEA-C6A0116515B6}" type="presParOf" srcId="{691C47FB-13A3-472B-BB44-EF786934BD4E}" destId="{D76A0D31-F925-4004-800C-B6247BFAAA61}" srcOrd="6" destOrd="0" presId="urn:microsoft.com/office/officeart/2005/8/layout/default"/>
+    <dgm:cxn modelId="{AEFCBD31-7672-44DF-AA7E-70CB1D1F05CF}" type="presParOf" srcId="{691C47FB-13A3-472B-BB44-EF786934BD4E}" destId="{6125DBD9-9EC7-4AC3-8734-025DAA5BAB09}" srcOrd="0" destOrd="0" presId="urn:microsoft.com/office/officeart/2005/8/layout/default#1"/>
+    <dgm:cxn modelId="{8AF96208-02DD-42A8-80BC-EF4A2C380375}" type="presParOf" srcId="{691C47FB-13A3-472B-BB44-EF786934BD4E}" destId="{3E40D1CF-79DF-4C39-85AB-03CF72679298}" srcOrd="1" destOrd="0" presId="urn:microsoft.com/office/officeart/2005/8/layout/default#1"/>
+    <dgm:cxn modelId="{52E06E64-8C2A-4754-9A6E-4CB9EEC9EBCA}" type="presParOf" srcId="{691C47FB-13A3-472B-BB44-EF786934BD4E}" destId="{AEAEB115-779F-487F-810D-60C7F890E03C}" srcOrd="2" destOrd="0" presId="urn:microsoft.com/office/officeart/2005/8/layout/default#1"/>
+    <dgm:cxn modelId="{B6CDC740-A68A-4D8A-A871-24691072D5DB}" type="presParOf" srcId="{691C47FB-13A3-472B-BB44-EF786934BD4E}" destId="{C279321C-6A40-4987-9592-BB6E77BB6B17}" srcOrd="3" destOrd="0" presId="urn:microsoft.com/office/officeart/2005/8/layout/default#1"/>
+    <dgm:cxn modelId="{CE6EC87D-9E32-4425-BEA8-298C69AFFFB1}" type="presParOf" srcId="{691C47FB-13A3-472B-BB44-EF786934BD4E}" destId="{D831E01B-93CF-4055-B393-B1C870C45908}" srcOrd="4" destOrd="0" presId="urn:microsoft.com/office/officeart/2005/8/layout/default#1"/>
+    <dgm:cxn modelId="{0CF7494B-70CB-40BA-A330-0F487F97D391}" type="presParOf" srcId="{691C47FB-13A3-472B-BB44-EF786934BD4E}" destId="{D7D3C4A5-E828-4277-B02F-D7AFCD318E4A}" srcOrd="5" destOrd="0" presId="urn:microsoft.com/office/officeart/2005/8/layout/default#1"/>
+    <dgm:cxn modelId="{F45B4201-702C-4461-BFEA-C6A0116515B6}" type="presParOf" srcId="{691C47FB-13A3-472B-BB44-EF786934BD4E}" destId="{D76A0D31-F925-4004-800C-B6247BFAAA61}" srcOrd="6" destOrd="0" presId="urn:microsoft.com/office/officeart/2005/8/layout/default#1"/>
   </dgm:cxnLst>
   <dgm:bg/>
   <dgm:whole/>
   <dgm:extLst>
     <a:ext uri="http://schemas.microsoft.com/office/drawing/2008/diagram">
-      <dsp:dataModelExt xmlns:dsp="http://schemas.microsoft.com/office/drawing/2008/diagram" relId="rId6" minVer="http://schemas.openxmlformats.org/drawingml/2006/diagram"/>
+      <dsp:dataModelExt xmlns:dsp="http://schemas.microsoft.com/office/drawing/2008/diagram" xmlns="" relId="rId6" minVer="http://schemas.openxmlformats.org/drawingml/2006/diagram"/>
     </a:ext>
   </dgm:extLst>
 </dgm:dataModel>
@@ -2100,6 +2128,13 @@
         </dgm:presLayoutVars>
       </dgm:prSet>
       <dgm:spPr/>
+      <dgm:t>
+        <a:bodyPr/>
+        <a:lstStyle/>
+        <a:p>
+          <a:endParaRPr lang="ru-RU"/>
+        </a:p>
+      </dgm:t>
     </dgm:pt>
     <dgm:pt modelId="{D03AA084-2B8F-43F1-A2AF-A4E681493867}" type="pres">
       <dgm:prSet presAssocID="{331B84DC-4C26-4C6D-8254-7FADA33585BC}" presName="roof" presStyleLbl="dkBgShp" presStyleIdx="0" presStyleCnt="2" custLinFactNeighborY="-1392"/>
@@ -2182,17 +2217,17 @@
     </dgm:pt>
   </dgm:ptLst>
   <dgm:cxnLst>
-    <dgm:cxn modelId="{B522625D-40DA-438C-8877-3EED90EB1476}" srcId="{331B84DC-4C26-4C6D-8254-7FADA33585BC}" destId="{7B476D2E-E4F2-4B8C-8064-147BA6227C0E}" srcOrd="2" destOrd="0" parTransId="{E1217964-0F95-4AA3-BCA7-86F55DC8287F}" sibTransId="{1E2330D1-8A1B-4B17-9562-CBA488C37FF9}"/>
-    <dgm:cxn modelId="{CD893354-0413-4101-8373-16FB1396A627}" type="presOf" srcId="{331B84DC-4C26-4C6D-8254-7FADA33585BC}" destId="{D03AA084-2B8F-43F1-A2AF-A4E681493867}" srcOrd="0" destOrd="0" presId="urn:microsoft.com/office/officeart/2005/8/layout/hList3"/>
-    <dgm:cxn modelId="{561C2B9B-F0B7-4D00-A2C8-BB68307BBE4F}" srcId="{331B84DC-4C26-4C6D-8254-7FADA33585BC}" destId="{58EC042E-CA62-48F4-998F-7365692B4AF1}" srcOrd="3" destOrd="0" parTransId="{B1689476-FF1C-48B1-94E5-5B9FB973A9D9}" sibTransId="{FD70973D-DECD-41AA-BF7B-0D48C2159000}"/>
+    <dgm:cxn modelId="{8DB8436D-B4B5-48DD-B69B-86D51CE8C1DB}" type="presOf" srcId="{782563C2-C6D8-4874-9210-C51100DBD603}" destId="{1B97F715-3222-4BE8-92EB-10F61675BF27}" srcOrd="0" destOrd="0" presId="urn:microsoft.com/office/officeart/2005/8/layout/hList3"/>
+    <dgm:cxn modelId="{D49762A9-99ED-44BF-B9BC-2028AEEE7D30}" srcId="{ECB48FF0-F3D0-4981-ABC5-C7FE296EF978}" destId="{331B84DC-4C26-4C6D-8254-7FADA33585BC}" srcOrd="0" destOrd="0" parTransId="{DFF0CA9A-7EFF-44BC-A7FB-785D5D433BEB}" sibTransId="{B627EE02-7B5B-4702-9BBC-8470BD4B8D8F}"/>
     <dgm:cxn modelId="{BBF1696B-1496-401B-85A4-3C791C238A35}" type="presOf" srcId="{7B476D2E-E4F2-4B8C-8064-147BA6227C0E}" destId="{B4B21757-BAB0-40F0-BFDF-38B30301199E}" srcOrd="0" destOrd="0" presId="urn:microsoft.com/office/officeart/2005/8/layout/hList3"/>
-    <dgm:cxn modelId="{8DB8436D-B4B5-48DD-B69B-86D51CE8C1DB}" type="presOf" srcId="{782563C2-C6D8-4874-9210-C51100DBD603}" destId="{1B97F715-3222-4BE8-92EB-10F61675BF27}" srcOrd="0" destOrd="0" presId="urn:microsoft.com/office/officeart/2005/8/layout/hList3"/>
-    <dgm:cxn modelId="{9647119C-5095-4332-9933-BE464CC4D060}" type="presOf" srcId="{10606B06-A63C-4AD5-B392-CCBE457F76F7}" destId="{B0791956-B19D-4D6A-AC7F-4003FF81DE85}" srcOrd="0" destOrd="0" presId="urn:microsoft.com/office/officeart/2005/8/layout/hList3"/>
     <dgm:cxn modelId="{B9FB829E-B005-43C3-B533-90894C8254B0}" type="presOf" srcId="{58EC042E-CA62-48F4-998F-7365692B4AF1}" destId="{4576AE07-1DC6-4A6E-8C34-FC1BE8E43F73}" srcOrd="0" destOrd="0" presId="urn:microsoft.com/office/officeart/2005/8/layout/hList3"/>
     <dgm:cxn modelId="{94291794-776D-4490-B1AC-ECCD5D3D0561}" srcId="{331B84DC-4C26-4C6D-8254-7FADA33585BC}" destId="{10606B06-A63C-4AD5-B392-CCBE457F76F7}" srcOrd="0" destOrd="0" parTransId="{D7294768-FF2D-4A01-BECD-048E669DB96C}" sibTransId="{62FC2D6B-998A-4B36-AEAE-FB21A44AEADA}"/>
+    <dgm:cxn modelId="{561C2B9B-F0B7-4D00-A2C8-BB68307BBE4F}" srcId="{331B84DC-4C26-4C6D-8254-7FADA33585BC}" destId="{58EC042E-CA62-48F4-998F-7365692B4AF1}" srcOrd="3" destOrd="0" parTransId="{B1689476-FF1C-48B1-94E5-5B9FB973A9D9}" sibTransId="{FD70973D-DECD-41AA-BF7B-0D48C2159000}"/>
+    <dgm:cxn modelId="{CD893354-0413-4101-8373-16FB1396A627}" type="presOf" srcId="{331B84DC-4C26-4C6D-8254-7FADA33585BC}" destId="{D03AA084-2B8F-43F1-A2AF-A4E681493867}" srcOrd="0" destOrd="0" presId="urn:microsoft.com/office/officeart/2005/8/layout/hList3"/>
+    <dgm:cxn modelId="{8EF8D7B3-FE24-40C4-BEA9-F7B5E739A6BA}" type="presOf" srcId="{ECB48FF0-F3D0-4981-ABC5-C7FE296EF978}" destId="{1B47E07D-3956-4973-B83E-903598033CD3}" srcOrd="0" destOrd="0" presId="urn:microsoft.com/office/officeart/2005/8/layout/hList3"/>
+    <dgm:cxn modelId="{B522625D-40DA-438C-8877-3EED90EB1476}" srcId="{331B84DC-4C26-4C6D-8254-7FADA33585BC}" destId="{7B476D2E-E4F2-4B8C-8064-147BA6227C0E}" srcOrd="2" destOrd="0" parTransId="{E1217964-0F95-4AA3-BCA7-86F55DC8287F}" sibTransId="{1E2330D1-8A1B-4B17-9562-CBA488C37FF9}"/>
     <dgm:cxn modelId="{D0217CDB-6CE4-4C66-8FD7-C4225103A4E5}" srcId="{331B84DC-4C26-4C6D-8254-7FADA33585BC}" destId="{782563C2-C6D8-4874-9210-C51100DBD603}" srcOrd="1" destOrd="0" parTransId="{25C1A5AF-6564-4B30-B8CB-A3C99513ED38}" sibTransId="{B8ACB162-E706-41FE-B8A6-BBC0CDC1017C}"/>
-    <dgm:cxn modelId="{8EF8D7B3-FE24-40C4-BEA9-F7B5E739A6BA}" type="presOf" srcId="{ECB48FF0-F3D0-4981-ABC5-C7FE296EF978}" destId="{1B47E07D-3956-4973-B83E-903598033CD3}" srcOrd="0" destOrd="0" presId="urn:microsoft.com/office/officeart/2005/8/layout/hList3"/>
-    <dgm:cxn modelId="{D49762A9-99ED-44BF-B9BC-2028AEEE7D30}" srcId="{ECB48FF0-F3D0-4981-ABC5-C7FE296EF978}" destId="{331B84DC-4C26-4C6D-8254-7FADA33585BC}" srcOrd="0" destOrd="0" parTransId="{DFF0CA9A-7EFF-44BC-A7FB-785D5D433BEB}" sibTransId="{B627EE02-7B5B-4702-9BBC-8470BD4B8D8F}"/>
+    <dgm:cxn modelId="{9647119C-5095-4332-9933-BE464CC4D060}" type="presOf" srcId="{10606B06-A63C-4AD5-B392-CCBE457F76F7}" destId="{B0791956-B19D-4D6A-AC7F-4003FF81DE85}" srcOrd="0" destOrd="0" presId="urn:microsoft.com/office/officeart/2005/8/layout/hList3"/>
     <dgm:cxn modelId="{BE37EAE5-A51C-440C-996A-C0BBC3DB287B}" type="presParOf" srcId="{1B47E07D-3956-4973-B83E-903598033CD3}" destId="{D03AA084-2B8F-43F1-A2AF-A4E681493867}" srcOrd="0" destOrd="0" presId="urn:microsoft.com/office/officeart/2005/8/layout/hList3"/>
     <dgm:cxn modelId="{A27B9B48-96A6-434B-9B21-3A53F0EE929A}" type="presParOf" srcId="{1B47E07D-3956-4973-B83E-903598033CD3}" destId="{4EFFF365-9A47-4D89-B541-F65A898D44A9}" srcOrd="1" destOrd="0" presId="urn:microsoft.com/office/officeart/2005/8/layout/hList3"/>
     <dgm:cxn modelId="{6268E7DD-08F2-4602-AC4F-5F71B571DB08}" type="presParOf" srcId="{4EFFF365-9A47-4D89-B541-F65A898D44A9}" destId="{B0791956-B19D-4D6A-AC7F-4003FF81DE85}" srcOrd="0" destOrd="0" presId="urn:microsoft.com/office/officeart/2005/8/layout/hList3"/>
@@ -2205,14 +2240,14 @@
   <dgm:whole/>
   <dgm:extLst>
     <a:ext uri="http://schemas.microsoft.com/office/drawing/2008/diagram">
-      <dsp:dataModelExt xmlns:dsp="http://schemas.microsoft.com/office/drawing/2008/diagram" relId="rId6" minVer="http://schemas.openxmlformats.org/drawingml/2006/diagram"/>
+      <dsp:dataModelExt xmlns:dsp="http://schemas.microsoft.com/office/drawing/2008/diagram" xmlns="" relId="rId6" minVer="http://schemas.openxmlformats.org/drawingml/2006/diagram"/>
     </a:ext>
   </dgm:extLst>
 </dgm:dataModel>
 </file>
 
 <file path=ppt/diagrams/drawing1.xml><?xml version="1.0" encoding="utf-8"?>
-<dsp:drawing xmlns:dgm="http://schemas.openxmlformats.org/drawingml/2006/diagram" xmlns:dsp="http://schemas.microsoft.com/office/drawing/2008/diagram" xmlns:a="http://schemas.openxmlformats.org/drawingml/2006/main">
+<dsp:drawing xmlns:dgm="http://schemas.openxmlformats.org/drawingml/2006/diagram" xmlns:a="http://schemas.openxmlformats.org/drawingml/2006/main" xmlns:dsp="http://schemas.microsoft.com/office/drawing/2008/diagram">
   <dsp:spTree>
     <dsp:nvGrpSpPr>
       <dsp:cNvPr id="0" name=""/>
@@ -2532,7 +2567,7 @@
 </file>
 
 <file path=ppt/diagrams/drawing2.xml><?xml version="1.0" encoding="utf-8"?>
-<dsp:drawing xmlns:dgm="http://schemas.openxmlformats.org/drawingml/2006/diagram" xmlns:dsp="http://schemas.microsoft.com/office/drawing/2008/diagram" xmlns:a="http://schemas.openxmlformats.org/drawingml/2006/main">
+<dsp:drawing xmlns:dgm="http://schemas.openxmlformats.org/drawingml/2006/diagram" xmlns:a="http://schemas.openxmlformats.org/drawingml/2006/main" xmlns:dsp="http://schemas.microsoft.com/office/drawing/2008/diagram">
   <dsp:spTree>
     <dsp:nvGrpSpPr>
       <dsp:cNvPr id="0" name=""/>
@@ -3011,7 +3046,7 @@
 </file>
 
 <file path=ppt/diagrams/layout1.xml><?xml version="1.0" encoding="utf-8"?>
-<dgm:layoutDef xmlns:dgm="http://schemas.openxmlformats.org/drawingml/2006/diagram" xmlns:a="http://schemas.openxmlformats.org/drawingml/2006/main" uniqueId="urn:microsoft.com/office/officeart/2005/8/layout/default">
+<dgm:layoutDef xmlns:dgm="http://schemas.openxmlformats.org/drawingml/2006/diagram" xmlns:a="http://schemas.openxmlformats.org/drawingml/2006/main" uniqueId="urn:microsoft.com/office/officeart/2005/8/layout/default#1">
   <dgm:title val=""/>
   <dgm:desc val=""/>
   <dgm:catLst>
@@ -5591,7 +5626,8 @@
           <a:p>
             <a:fld id="{87FC914D-55BF-4435-8FF9-370697927C3F}" type="datetimeFigureOut">
               <a:rPr lang="ru-RU" smtClean="0"/>
-              <a:t>13.10.2013</a:t>
+              <a:pPr/>
+              <a:t>14.10.2013</a:t>
             </a:fld>
             <a:endParaRPr lang="ru-RU"/>
           </a:p>
@@ -5633,6 +5669,7 @@
           <a:p>
             <a:fld id="{B47D36E2-E581-4410-93AF-DF24074D0B8B}" type="slidenum">
               <a:rPr lang="ru-RU" smtClean="0"/>
+              <a:pPr/>
               <a:t>‹#›</a:t>
             </a:fld>
             <a:endParaRPr lang="ru-RU"/>
@@ -5756,7 +5793,8 @@
           <a:p>
             <a:fld id="{87FC914D-55BF-4435-8FF9-370697927C3F}" type="datetimeFigureOut">
               <a:rPr lang="ru-RU" smtClean="0"/>
-              <a:t>13.10.2013</a:t>
+              <a:pPr/>
+              <a:t>14.10.2013</a:t>
             </a:fld>
             <a:endParaRPr lang="ru-RU"/>
           </a:p>
@@ -5798,6 +5836,7 @@
           <a:p>
             <a:fld id="{B47D36E2-E581-4410-93AF-DF24074D0B8B}" type="slidenum">
               <a:rPr lang="ru-RU" smtClean="0"/>
+              <a:pPr/>
               <a:t>‹#›</a:t>
             </a:fld>
             <a:endParaRPr lang="ru-RU"/>
@@ -5931,7 +5970,8 @@
           <a:p>
             <a:fld id="{87FC914D-55BF-4435-8FF9-370697927C3F}" type="datetimeFigureOut">
               <a:rPr lang="ru-RU" smtClean="0"/>
-              <a:t>13.10.2013</a:t>
+              <a:pPr/>
+              <a:t>14.10.2013</a:t>
             </a:fld>
             <a:endParaRPr lang="ru-RU"/>
           </a:p>
@@ -5973,6 +6013,7 @@
           <a:p>
             <a:fld id="{B47D36E2-E581-4410-93AF-DF24074D0B8B}" type="slidenum">
               <a:rPr lang="ru-RU" smtClean="0"/>
+              <a:pPr/>
               <a:t>‹#›</a:t>
             </a:fld>
             <a:endParaRPr lang="ru-RU"/>
@@ -6096,7 +6137,8 @@
           <a:p>
             <a:fld id="{87FC914D-55BF-4435-8FF9-370697927C3F}" type="datetimeFigureOut">
               <a:rPr lang="ru-RU" smtClean="0"/>
-              <a:t>13.10.2013</a:t>
+              <a:pPr/>
+              <a:t>14.10.2013</a:t>
             </a:fld>
             <a:endParaRPr lang="ru-RU"/>
           </a:p>
@@ -6138,6 +6180,7 @@
           <a:p>
             <a:fld id="{B47D36E2-E581-4410-93AF-DF24074D0B8B}" type="slidenum">
               <a:rPr lang="ru-RU" smtClean="0"/>
+              <a:pPr/>
               <a:t>‹#›</a:t>
             </a:fld>
             <a:endParaRPr lang="ru-RU"/>
@@ -6338,7 +6381,8 @@
           <a:p>
             <a:fld id="{87FC914D-55BF-4435-8FF9-370697927C3F}" type="datetimeFigureOut">
               <a:rPr lang="ru-RU" smtClean="0"/>
-              <a:t>13.10.2013</a:t>
+              <a:pPr/>
+              <a:t>14.10.2013</a:t>
             </a:fld>
             <a:endParaRPr lang="ru-RU"/>
           </a:p>
@@ -6380,6 +6424,7 @@
           <a:p>
             <a:fld id="{B47D36E2-E581-4410-93AF-DF24074D0B8B}" type="slidenum">
               <a:rPr lang="ru-RU" smtClean="0"/>
+              <a:pPr/>
               <a:t>‹#›</a:t>
             </a:fld>
             <a:endParaRPr lang="ru-RU"/>
@@ -6602,7 +6647,8 @@
           <a:p>
             <a:fld id="{87FC914D-55BF-4435-8FF9-370697927C3F}" type="datetimeFigureOut">
               <a:rPr lang="ru-RU" smtClean="0"/>
-              <a:t>13.10.2013</a:t>
+              <a:pPr/>
+              <a:t>14.10.2013</a:t>
             </a:fld>
             <a:endParaRPr lang="ru-RU"/>
           </a:p>
@@ -6644,6 +6690,7 @@
           <a:p>
             <a:fld id="{B47D36E2-E581-4410-93AF-DF24074D0B8B}" type="slidenum">
               <a:rPr lang="ru-RU" smtClean="0"/>
+              <a:pPr/>
               <a:t>‹#›</a:t>
             </a:fld>
             <a:endParaRPr lang="ru-RU"/>
@@ -6980,7 +7027,8 @@
           <a:p>
             <a:fld id="{87FC914D-55BF-4435-8FF9-370697927C3F}" type="datetimeFigureOut">
               <a:rPr lang="ru-RU" smtClean="0"/>
-              <a:t>13.10.2013</a:t>
+              <a:pPr/>
+              <a:t>14.10.2013</a:t>
             </a:fld>
             <a:endParaRPr lang="ru-RU"/>
           </a:p>
@@ -7022,6 +7070,7 @@
           <a:p>
             <a:fld id="{B47D36E2-E581-4410-93AF-DF24074D0B8B}" type="slidenum">
               <a:rPr lang="ru-RU" smtClean="0"/>
+              <a:pPr/>
               <a:t>‹#›</a:t>
             </a:fld>
             <a:endParaRPr lang="ru-RU"/>
@@ -7130,7 +7179,8 @@
           <a:p>
             <a:fld id="{87FC914D-55BF-4435-8FF9-370697927C3F}" type="datetimeFigureOut">
               <a:rPr lang="ru-RU" smtClean="0"/>
-              <a:t>13.10.2013</a:t>
+              <a:pPr/>
+              <a:t>14.10.2013</a:t>
             </a:fld>
             <a:endParaRPr lang="ru-RU"/>
           </a:p>
@@ -7172,6 +7222,7 @@
           <a:p>
             <a:fld id="{B47D36E2-E581-4410-93AF-DF24074D0B8B}" type="slidenum">
               <a:rPr lang="ru-RU" smtClean="0"/>
+              <a:pPr/>
               <a:t>‹#›</a:t>
             </a:fld>
             <a:endParaRPr lang="ru-RU"/>
@@ -7220,7 +7271,8 @@
           <a:p>
             <a:fld id="{87FC914D-55BF-4435-8FF9-370697927C3F}" type="datetimeFigureOut">
               <a:rPr lang="ru-RU" smtClean="0"/>
-              <a:t>13.10.2013</a:t>
+              <a:pPr/>
+              <a:t>14.10.2013</a:t>
             </a:fld>
             <a:endParaRPr lang="ru-RU"/>
           </a:p>
@@ -7262,6 +7314,7 @@
           <a:p>
             <a:fld id="{B47D36E2-E581-4410-93AF-DF24074D0B8B}" type="slidenum">
               <a:rPr lang="ru-RU" smtClean="0"/>
+              <a:pPr/>
               <a:t>‹#›</a:t>
             </a:fld>
             <a:endParaRPr lang="ru-RU"/>
@@ -7481,7 +7534,8 @@
           <a:p>
             <a:fld id="{87FC914D-55BF-4435-8FF9-370697927C3F}" type="datetimeFigureOut">
               <a:rPr lang="ru-RU" smtClean="0"/>
-              <a:t>13.10.2013</a:t>
+              <a:pPr/>
+              <a:t>14.10.2013</a:t>
             </a:fld>
             <a:endParaRPr lang="ru-RU"/>
           </a:p>
@@ -7523,6 +7577,7 @@
           <a:p>
             <a:fld id="{B47D36E2-E581-4410-93AF-DF24074D0B8B}" type="slidenum">
               <a:rPr lang="ru-RU" smtClean="0"/>
+              <a:pPr/>
               <a:t>‹#›</a:t>
             </a:fld>
             <a:endParaRPr lang="ru-RU"/>
@@ -7769,7 +7824,8 @@
           <a:p>
             <a:fld id="{87FC914D-55BF-4435-8FF9-370697927C3F}" type="datetimeFigureOut">
               <a:rPr lang="ru-RU" smtClean="0"/>
-              <a:t>13.10.2013</a:t>
+              <a:pPr/>
+              <a:t>14.10.2013</a:t>
             </a:fld>
             <a:endParaRPr lang="ru-RU"/>
           </a:p>
@@ -7816,6 +7872,7 @@
           <a:p>
             <a:fld id="{B47D36E2-E581-4410-93AF-DF24074D0B8B}" type="slidenum">
               <a:rPr lang="ru-RU" smtClean="0"/>
+              <a:pPr/>
               <a:t>‹#›</a:t>
             </a:fld>
             <a:endParaRPr lang="ru-RU"/>
@@ -8540,7 +8597,8 @@
           <a:p>
             <a:fld id="{87FC914D-55BF-4435-8FF9-370697927C3F}" type="datetimeFigureOut">
               <a:rPr lang="ru-RU" smtClean="0"/>
-              <a:t>13.10.2013</a:t>
+              <a:pPr/>
+              <a:t>14.10.2013</a:t>
             </a:fld>
             <a:endParaRPr lang="ru-RU"/>
           </a:p>
@@ -8618,6 +8676,7 @@
           <a:p>
             <a:fld id="{B47D36E2-E581-4410-93AF-DF24074D0B8B}" type="slidenum">
               <a:rPr lang="ru-RU" smtClean="0"/>
+              <a:pPr/>
               <a:t>‹#›</a:t>
             </a:fld>
             <a:endParaRPr lang="ru-RU"/>
@@ -9252,7 +9311,7 @@
     </p:spTree>
     <p:extLst>
       <p:ext uri="{BB962C8B-B14F-4D97-AF65-F5344CB8AC3E}">
-        <p14:creationId xmlns:p14="http://schemas.microsoft.com/office/powerpoint/2010/main" val="3383167454"/>
+        <p14:creationId xmlns:p14="http://schemas.microsoft.com/office/powerpoint/2010/main" xmlns="" val="3383167454"/>
       </p:ext>
     </p:extLst>
   </p:cSld>
@@ -9352,10 +9411,10 @@
           <p:nvPr/>
         </p:nvPicPr>
         <p:blipFill>
-          <a:blip r:embed="rId2">
+          <a:blip r:embed="rId2" cstate="print">
             <a:extLst>
               <a:ext uri="{28A0092B-C50C-407E-A947-70E740481C1C}">
-                <a14:useLocalDpi xmlns:a14="http://schemas.microsoft.com/office/drawing/2010/main" val="0"/>
+                <a14:useLocalDpi xmlns:a14="http://schemas.microsoft.com/office/drawing/2010/main" xmlns="" val="0"/>
               </a:ext>
             </a:extLst>
           </a:blip>
@@ -9378,14 +9437,14 @@
           </a:ln>
           <a:extLst>
             <a:ext uri="{909E8E84-426E-40DD-AFC4-6F175D3DCCD1}">
-              <a14:hiddenFill xmlns:a14="http://schemas.microsoft.com/office/drawing/2010/main">
+              <a14:hiddenFill xmlns:a14="http://schemas.microsoft.com/office/drawing/2010/main" xmlns="">
                 <a:solidFill>
                   <a:schemeClr val="accent1"/>
                 </a:solidFill>
               </a14:hiddenFill>
             </a:ext>
             <a:ext uri="{91240B29-F687-4F45-9708-019B960494DF}">
-              <a14:hiddenLine xmlns:a14="http://schemas.microsoft.com/office/drawing/2010/main" w="9525">
+              <a14:hiddenLine xmlns:a14="http://schemas.microsoft.com/office/drawing/2010/main" xmlns="" w="9525">
                 <a:solidFill>
                   <a:schemeClr val="tx1"/>
                 </a:solidFill>
@@ -9400,13 +9459,20 @@
     </p:spTree>
     <p:extLst>
       <p:ext uri="{BB962C8B-B14F-4D97-AF65-F5344CB8AC3E}">
-        <p14:creationId xmlns:p14="http://schemas.microsoft.com/office/powerpoint/2010/main" val="904123109"/>
+        <p14:creationId xmlns:p14="http://schemas.microsoft.com/office/powerpoint/2010/main" xmlns="" val="904123109"/>
       </p:ext>
     </p:extLst>
   </p:cSld>
   <p:clrMapOvr>
     <a:masterClrMapping/>
   </p:clrMapOvr>
+  <p:timing>
+    <p:tnLst>
+      <p:par>
+        <p:cTn id="1" dur="indefinite" restart="never" nodeType="tmRoot"/>
+      </p:par>
+    </p:tnLst>
+  </p:timing>
 </p:sld>
 </file>
 
@@ -9491,14 +9557,13 @@
               <a:rPr lang="ru-RU" sz="3200" dirty="0"/>
               <a:t>которое может быть использовано в локальных сетях предприятий, а также в домашних сетях для общения пользователей и передачи информации между ними.</a:t>
             </a:r>
-            <a:endParaRPr lang="ru-RU" sz="3200" dirty="0"/>
           </a:p>
         </p:txBody>
       </p:sp>
     </p:spTree>
     <p:extLst>
       <p:ext uri="{BB962C8B-B14F-4D97-AF65-F5344CB8AC3E}">
-        <p14:creationId xmlns:p14="http://schemas.microsoft.com/office/powerpoint/2010/main" val="3851231248"/>
+        <p14:creationId xmlns:p14="http://schemas.microsoft.com/office/powerpoint/2010/main" xmlns="" val="3851231248"/>
       </p:ext>
     </p:extLst>
   </p:cSld>
@@ -9556,10 +9621,6 @@
           <a:p>
             <a:pPr algn="r"/>
             <a:r>
-              <a:rPr lang="ru-RU" sz="5300" b="1" dirty="0" smtClean="0"/>
-              <a:t>Спасибо за внимание</a:t>
-            </a:r>
-            <a:r>
               <a:rPr lang="ru-RU" b="1" dirty="0" smtClean="0"/>
               <a:t/>
             </a:r>
@@ -9615,7 +9676,11 @@
             <a:pPr algn="ctr"/>
             <a:r>
               <a:rPr lang="ru-RU" sz="6000" b="1" dirty="0" smtClean="0"/>
-              <a:t>Ваши вопросы ?</a:t>
+              <a:t>Спасибо за </a:t>
+            </a:r>
+            <a:r>
+              <a:rPr lang="ru-RU" sz="6000" b="1" dirty="0" smtClean="0"/>
+              <a:t>внимание</a:t>
             </a:r>
             <a:endParaRPr lang="ru-RU" sz="6000" b="1" dirty="0"/>
           </a:p>
@@ -9624,7 +9689,7 @@
     </p:spTree>
     <p:extLst>
       <p:ext uri="{BB962C8B-B14F-4D97-AF65-F5344CB8AC3E}">
-        <p14:creationId xmlns:p14="http://schemas.microsoft.com/office/powerpoint/2010/main" val="678064763"/>
+        <p14:creationId xmlns:p14="http://schemas.microsoft.com/office/powerpoint/2010/main" xmlns="" val="678064763"/>
       </p:ext>
     </p:extLst>
   </p:cSld>
@@ -9750,7 +9815,7 @@
     </p:spTree>
     <p:extLst>
       <p:ext uri="{BB962C8B-B14F-4D97-AF65-F5344CB8AC3E}">
-        <p14:creationId xmlns:p14="http://schemas.microsoft.com/office/powerpoint/2010/main" val="2643790502"/>
+        <p14:creationId xmlns:p14="http://schemas.microsoft.com/office/powerpoint/2010/main" xmlns="" val="2643790502"/>
       </p:ext>
     </p:extLst>
   </p:cSld>
@@ -9859,7 +9924,7 @@
     </p:spTree>
     <p:extLst>
       <p:ext uri="{BB962C8B-B14F-4D97-AF65-F5344CB8AC3E}">
-        <p14:creationId xmlns:p14="http://schemas.microsoft.com/office/powerpoint/2010/main" val="3471345304"/>
+        <p14:creationId xmlns:p14="http://schemas.microsoft.com/office/powerpoint/2010/main" xmlns="" val="3471345304"/>
       </p:ext>
     </p:extLst>
   </p:cSld>
@@ -9941,7 +10006,7 @@
             <p:ph idx="1"/>
             <p:extLst>
               <p:ext uri="{D42A27DB-BD31-4B8C-83A1-F6EECF244321}">
-                <p14:modId xmlns:p14="http://schemas.microsoft.com/office/powerpoint/2010/main" val="1322198696"/>
+                <p14:modId xmlns:p14="http://schemas.microsoft.com/office/powerpoint/2010/main" xmlns="" val="1322198696"/>
               </p:ext>
             </p:extLst>
           </p:nvPr>
@@ -9959,7 +10024,7 @@
     </p:spTree>
     <p:extLst>
       <p:ext uri="{BB962C8B-B14F-4D97-AF65-F5344CB8AC3E}">
-        <p14:creationId xmlns:p14="http://schemas.microsoft.com/office/powerpoint/2010/main" val="3703460918"/>
+        <p14:creationId xmlns:p14="http://schemas.microsoft.com/office/powerpoint/2010/main" xmlns="" val="3703460918"/>
       </p:ext>
     </p:extLst>
   </p:cSld>
@@ -10065,7 +10130,7 @@
     </p:spTree>
     <p:extLst>
       <p:ext uri="{BB962C8B-B14F-4D97-AF65-F5344CB8AC3E}">
-        <p14:creationId xmlns:p14="http://schemas.microsoft.com/office/powerpoint/2010/main" val="2507090578"/>
+        <p14:creationId xmlns:p14="http://schemas.microsoft.com/office/powerpoint/2010/main" xmlns="" val="2507090578"/>
       </p:ext>
     </p:extLst>
   </p:cSld>
@@ -10174,7 +10239,7 @@
     </p:spTree>
     <p:extLst>
       <p:ext uri="{BB962C8B-B14F-4D97-AF65-F5344CB8AC3E}">
-        <p14:creationId xmlns:p14="http://schemas.microsoft.com/office/powerpoint/2010/main" val="2204282487"/>
+        <p14:creationId xmlns:p14="http://schemas.microsoft.com/office/powerpoint/2010/main" xmlns="" val="2204282487"/>
       </p:ext>
     </p:extLst>
   </p:cSld>
@@ -10278,7 +10343,7 @@
     </p:spTree>
     <p:extLst>
       <p:ext uri="{BB962C8B-B14F-4D97-AF65-F5344CB8AC3E}">
-        <p14:creationId xmlns:p14="http://schemas.microsoft.com/office/powerpoint/2010/main" val="4116011150"/>
+        <p14:creationId xmlns:p14="http://schemas.microsoft.com/office/powerpoint/2010/main" xmlns="" val="4116011150"/>
       </p:ext>
     </p:extLst>
   </p:cSld>
@@ -10351,7 +10416,7 @@
             <p:ph idx="1"/>
             <p:extLst>
               <p:ext uri="{D42A27DB-BD31-4B8C-83A1-F6EECF244321}">
-                <p14:modId xmlns:p14="http://schemas.microsoft.com/office/powerpoint/2010/main" val="2156154698"/>
+                <p14:modId xmlns:p14="http://schemas.microsoft.com/office/powerpoint/2010/main" xmlns="" val="2156154698"/>
               </p:ext>
             </p:extLst>
           </p:nvPr>
@@ -10369,7 +10434,7 @@
     </p:spTree>
     <p:extLst>
       <p:ext uri="{BB962C8B-B14F-4D97-AF65-F5344CB8AC3E}">
-        <p14:creationId xmlns:p14="http://schemas.microsoft.com/office/powerpoint/2010/main" val="52864068"/>
+        <p14:creationId xmlns:p14="http://schemas.microsoft.com/office/powerpoint/2010/main" xmlns="" val="52864068"/>
       </p:ext>
     </p:extLst>
   </p:cSld>
@@ -10469,10 +10534,10 @@
           <p:nvPr/>
         </p:nvPicPr>
         <p:blipFill rotWithShape="1">
-          <a:blip r:embed="rId2">
+          <a:blip r:embed="rId2" cstate="print">
             <a:extLst>
               <a:ext uri="{28A0092B-C50C-407E-A947-70E740481C1C}">
-                <a14:useLocalDpi xmlns:a14="http://schemas.microsoft.com/office/drawing/2010/main" val="0"/>
+                <a14:useLocalDpi xmlns:a14="http://schemas.microsoft.com/office/drawing/2010/main" xmlns="" val="0"/>
               </a:ext>
             </a:extLst>
           </a:blip>
@@ -10493,14 +10558,14 @@
           </a:ln>
           <a:extLst>
             <a:ext uri="{909E8E84-426E-40DD-AFC4-6F175D3DCCD1}">
-              <a14:hiddenFill xmlns:a14="http://schemas.microsoft.com/office/drawing/2010/main">
+              <a14:hiddenFill xmlns:a14="http://schemas.microsoft.com/office/drawing/2010/main" xmlns="">
                 <a:solidFill>
                   <a:schemeClr val="accent1"/>
                 </a:solidFill>
               </a14:hiddenFill>
             </a:ext>
             <a:ext uri="{91240B29-F687-4F45-9708-019B960494DF}">
-              <a14:hiddenLine xmlns:a14="http://schemas.microsoft.com/office/drawing/2010/main" w="9525">
+              <a14:hiddenLine xmlns:a14="http://schemas.microsoft.com/office/drawing/2010/main" xmlns="" w="9525">
                 <a:solidFill>
                   <a:schemeClr val="tx1"/>
                 </a:solidFill>
@@ -10521,10 +10586,10 @@
           <p:nvPr/>
         </p:nvPicPr>
         <p:blipFill>
-          <a:blip r:embed="rId3">
+          <a:blip r:embed="rId3" cstate="print">
             <a:extLst>
               <a:ext uri="{28A0092B-C50C-407E-A947-70E740481C1C}">
-                <a14:useLocalDpi xmlns:a14="http://schemas.microsoft.com/office/drawing/2010/main" val="0"/>
+                <a14:useLocalDpi xmlns:a14="http://schemas.microsoft.com/office/drawing/2010/main" xmlns="" val="0"/>
               </a:ext>
             </a:extLst>
           </a:blip>
@@ -10547,14 +10612,14 @@
           </a:ln>
           <a:extLst>
             <a:ext uri="{909E8E84-426E-40DD-AFC4-6F175D3DCCD1}">
-              <a14:hiddenFill xmlns:a14="http://schemas.microsoft.com/office/drawing/2010/main">
+              <a14:hiddenFill xmlns:a14="http://schemas.microsoft.com/office/drawing/2010/main" xmlns="">
                 <a:solidFill>
                   <a:schemeClr val="accent1"/>
                 </a:solidFill>
               </a14:hiddenFill>
             </a:ext>
             <a:ext uri="{91240B29-F687-4F45-9708-019B960494DF}">
-              <a14:hiddenLine xmlns:a14="http://schemas.microsoft.com/office/drawing/2010/main" w="9525">
+              <a14:hiddenLine xmlns:a14="http://schemas.microsoft.com/office/drawing/2010/main" xmlns="" w="9525">
                 <a:solidFill>
                   <a:schemeClr val="tx1"/>
                 </a:solidFill>
@@ -10569,13 +10634,20 @@
     </p:spTree>
     <p:extLst>
       <p:ext uri="{BB962C8B-B14F-4D97-AF65-F5344CB8AC3E}">
-        <p14:creationId xmlns:p14="http://schemas.microsoft.com/office/powerpoint/2010/main" val="2509104840"/>
+        <p14:creationId xmlns:p14="http://schemas.microsoft.com/office/powerpoint/2010/main" xmlns="" val="2509104840"/>
       </p:ext>
     </p:extLst>
   </p:cSld>
   <p:clrMapOvr>
     <a:masterClrMapping/>
   </p:clrMapOvr>
+  <p:timing>
+    <p:tnLst>
+      <p:par>
+        <p:cTn id="1" dur="indefinite" restart="never" nodeType="tmRoot"/>
+      </p:par>
+    </p:tnLst>
+  </p:timing>
 </p:sld>
 </file>
 

</xml_diff>